<commit_message>
Presentation: Fixed error in acknowledgements
</commit_message>
<xml_diff>
--- a/Reflection/Cloud VR – Distributed VR Solutions(1).pptx
+++ b/Reflection/Cloud VR – Distributed VR Solutions(1).pptx
@@ -2062,6 +2062,13 @@
         </dgm:presLayoutVars>
       </dgm:prSet>
       <dgm:spPr/>
+      <dgm:t>
+        <a:bodyPr/>
+        <a:lstStyle/>
+        <a:p>
+          <a:endParaRPr lang="en-US"/>
+        </a:p>
+      </dgm:t>
     </dgm:pt>
     <dgm:pt modelId="{74DF1E11-694C-45F9-9BEC-CCDB3212C12D}" type="pres">
       <dgm:prSet presAssocID="{DFA002B4-5FB6-4AF0-95A0-DC2D878C6783}" presName="linNode" presStyleCnt="0"/>
@@ -2075,6 +2082,13 @@
         </dgm:presLayoutVars>
       </dgm:prSet>
       <dgm:spPr/>
+      <dgm:t>
+        <a:bodyPr/>
+        <a:lstStyle/>
+        <a:p>
+          <a:endParaRPr lang="en-US"/>
+        </a:p>
+      </dgm:t>
     </dgm:pt>
     <dgm:pt modelId="{34E65F8D-DAD9-4410-AEEF-3E48EF209A75}" type="pres">
       <dgm:prSet presAssocID="{8077EF59-4364-433E-B276-BF6ACA571DC8}" presName="sp" presStyleCnt="0"/>
@@ -2092,6 +2106,13 @@
         </dgm:presLayoutVars>
       </dgm:prSet>
       <dgm:spPr/>
+      <dgm:t>
+        <a:bodyPr/>
+        <a:lstStyle/>
+        <a:p>
+          <a:endParaRPr lang="en-US"/>
+        </a:p>
+      </dgm:t>
     </dgm:pt>
     <dgm:pt modelId="{DCA53B1A-921F-48B4-8018-CFEB406FDB87}" type="pres">
       <dgm:prSet presAssocID="{3E3326A7-800B-4B27-9046-4FAF1777F137}" presName="sp" presStyleCnt="0"/>
@@ -2109,16 +2130,23 @@
         </dgm:presLayoutVars>
       </dgm:prSet>
       <dgm:spPr/>
+      <dgm:t>
+        <a:bodyPr/>
+        <a:lstStyle/>
+        <a:p>
+          <a:endParaRPr lang="en-US"/>
+        </a:p>
+      </dgm:t>
     </dgm:pt>
   </dgm:ptLst>
   <dgm:cxnLst>
     <dgm:cxn modelId="{97829E04-F224-4A33-87D3-E55C1B4DD056}" srcId="{790844E7-2D98-4113-ABEB-532E72675C16}" destId="{DFA002B4-5FB6-4AF0-95A0-DC2D878C6783}" srcOrd="0" destOrd="0" parTransId="{6DB69DB5-A079-4845-B6CC-1C2F229BE806}" sibTransId="{8077EF59-4364-433E-B276-BF6ACA571DC8}"/>
     <dgm:cxn modelId="{5023140A-57AD-4225-82B6-B520C81EE752}" type="presOf" srcId="{DFA002B4-5FB6-4AF0-95A0-DC2D878C6783}" destId="{B575B7AD-9C86-4377-9F31-3436D9272D7A}" srcOrd="0" destOrd="0" presId="urn:microsoft.com/office/officeart/2005/8/layout/vList5"/>
+    <dgm:cxn modelId="{D5A60DF9-2995-4D43-BF23-780B4FF536C2}" type="presOf" srcId="{F932FE31-00C4-4C92-8DE4-D5DF3F683EB5}" destId="{800D3D1D-1090-42B2-96F7-E85043C3F0A5}" srcOrd="0" destOrd="0" presId="urn:microsoft.com/office/officeart/2005/8/layout/vList5"/>
     <dgm:cxn modelId="{69695E19-456B-4568-AFB6-BA684669BD72}" srcId="{790844E7-2D98-4113-ABEB-532E72675C16}" destId="{98795B26-162A-4DAD-9FC2-CCDE2C7262A1}" srcOrd="1" destOrd="0" parTransId="{8EC1081D-7675-401B-BC59-9B1A6087768A}" sibTransId="{3E3326A7-800B-4B27-9046-4FAF1777F137}"/>
+    <dgm:cxn modelId="{DE0C39AD-9AF8-4229-87BD-9E242847474B}" srcId="{790844E7-2D98-4113-ABEB-532E72675C16}" destId="{F932FE31-00C4-4C92-8DE4-D5DF3F683EB5}" srcOrd="2" destOrd="0" parTransId="{70C95BBD-4D96-472A-930D-C3D43E59C726}" sibTransId="{11C1150D-089C-4FD5-927A-9DAF9A9BC155}"/>
     <dgm:cxn modelId="{B056DE4B-2234-403E-9614-140B50B4AF5A}" type="presOf" srcId="{98795B26-162A-4DAD-9FC2-CCDE2C7262A1}" destId="{1A83D58F-7A7B-4B65-94D1-9DBE3078241C}" srcOrd="0" destOrd="0" presId="urn:microsoft.com/office/officeart/2005/8/layout/vList5"/>
     <dgm:cxn modelId="{F6141052-5E78-4E64-ABCE-26420D74625B}" type="presOf" srcId="{790844E7-2D98-4113-ABEB-532E72675C16}" destId="{1889118A-2C07-4723-BA93-2899760D9695}" srcOrd="0" destOrd="0" presId="urn:microsoft.com/office/officeart/2005/8/layout/vList5"/>
-    <dgm:cxn modelId="{DE0C39AD-9AF8-4229-87BD-9E242847474B}" srcId="{790844E7-2D98-4113-ABEB-532E72675C16}" destId="{F932FE31-00C4-4C92-8DE4-D5DF3F683EB5}" srcOrd="2" destOrd="0" parTransId="{70C95BBD-4D96-472A-930D-C3D43E59C726}" sibTransId="{11C1150D-089C-4FD5-927A-9DAF9A9BC155}"/>
-    <dgm:cxn modelId="{D5A60DF9-2995-4D43-BF23-780B4FF536C2}" type="presOf" srcId="{F932FE31-00C4-4C92-8DE4-D5DF3F683EB5}" destId="{800D3D1D-1090-42B2-96F7-E85043C3F0A5}" srcOrd="0" destOrd="0" presId="urn:microsoft.com/office/officeart/2005/8/layout/vList5"/>
     <dgm:cxn modelId="{4D513DEC-01DC-4676-9DB9-A93F5A60A29B}" type="presParOf" srcId="{1889118A-2C07-4723-BA93-2899760D9695}" destId="{74DF1E11-694C-45F9-9BEC-CCDB3212C12D}" srcOrd="0" destOrd="0" presId="urn:microsoft.com/office/officeart/2005/8/layout/vList5"/>
     <dgm:cxn modelId="{2C89C2C7-46B2-4416-9C11-2FA9C9BF1E3F}" type="presParOf" srcId="{74DF1E11-694C-45F9-9BEC-CCDB3212C12D}" destId="{B575B7AD-9C86-4377-9F31-3436D9272D7A}" srcOrd="0" destOrd="0" presId="urn:microsoft.com/office/officeart/2005/8/layout/vList5"/>
     <dgm:cxn modelId="{E5754359-18BC-43FC-997C-39CCC7E06C7D}" type="presParOf" srcId="{1889118A-2C07-4723-BA93-2899760D9695}" destId="{34E65F8D-DAD9-4410-AEEF-3E48EF209A75}" srcOrd="1" destOrd="0" presId="urn:microsoft.com/office/officeart/2005/8/layout/vList5"/>
@@ -2201,7 +2229,7 @@
         </a:bodyPr>
         <a:lstStyle/>
         <a:p>
-          <a:pPr marL="0" lvl="0" indent="0" algn="ctr" defTabSz="800100">
+          <a:pPr lvl="0" algn="ctr" defTabSz="800100">
             <a:lnSpc>
               <a:spcPct val="90000"/>
             </a:lnSpc>
@@ -2211,7 +2239,6 @@
             <a:spcAft>
               <a:spcPct val="35000"/>
             </a:spcAft>
-            <a:buNone/>
           </a:pPr>
           <a:r>
             <a:rPr lang="en-US" sz="1800" kern="1200"/>
@@ -2279,7 +2306,7 @@
         </a:bodyPr>
         <a:lstStyle/>
         <a:p>
-          <a:pPr marL="0" lvl="0" indent="0" algn="ctr" defTabSz="800100">
+          <a:pPr lvl="0" algn="ctr" defTabSz="800100">
             <a:lnSpc>
               <a:spcPct val="90000"/>
             </a:lnSpc>
@@ -2289,7 +2316,6 @@
             <a:spcAft>
               <a:spcPct val="35000"/>
             </a:spcAft>
-            <a:buNone/>
           </a:pPr>
           <a:r>
             <a:rPr lang="en-US" sz="1800" kern="1200"/>
@@ -2357,7 +2383,7 @@
         </a:bodyPr>
         <a:lstStyle/>
         <a:p>
-          <a:pPr marL="0" lvl="0" indent="0" algn="ctr" defTabSz="800100">
+          <a:pPr lvl="0" algn="ctr" defTabSz="800100">
             <a:lnSpc>
               <a:spcPct val="90000"/>
             </a:lnSpc>
@@ -2367,7 +2393,6 @@
             <a:spcAft>
               <a:spcPct val="35000"/>
             </a:spcAft>
-            <a:buNone/>
           </a:pPr>
           <a:r>
             <a:rPr lang="en-US" sz="1800" kern="1200"/>
@@ -3780,7 +3805,7 @@
           <a:p>
             <a:fld id="{2BED0D0C-FD69-484B-864E-E341E636C72D}" type="datetimeFigureOut">
               <a:rPr lang="en-US" smtClean="0"/>
-              <a:t>10/23/2020</a:t>
+              <a:t>11/6/2020</a:t>
             </a:fld>
             <a:endParaRPr lang="en-US"/>
           </a:p>
@@ -3948,7 +3973,7 @@
           <a:p>
             <a:fld id="{2BED0D0C-FD69-484B-864E-E341E636C72D}" type="datetimeFigureOut">
               <a:rPr lang="en-US" smtClean="0"/>
-              <a:t>10/23/2020</a:t>
+              <a:t>11/6/2020</a:t>
             </a:fld>
             <a:endParaRPr lang="en-US"/>
           </a:p>
@@ -4126,7 +4151,7 @@
           <a:p>
             <a:fld id="{2BED0D0C-FD69-484B-864E-E341E636C72D}" type="datetimeFigureOut">
               <a:rPr lang="en-US" smtClean="0"/>
-              <a:t>10/23/2020</a:t>
+              <a:t>11/6/2020</a:t>
             </a:fld>
             <a:endParaRPr lang="en-US"/>
           </a:p>
@@ -4294,7 +4319,7 @@
           <a:p>
             <a:fld id="{2BED0D0C-FD69-484B-864E-E341E636C72D}" type="datetimeFigureOut">
               <a:rPr lang="en-US" smtClean="0"/>
-              <a:t>10/23/2020</a:t>
+              <a:t>11/6/2020</a:t>
             </a:fld>
             <a:endParaRPr lang="en-US"/>
           </a:p>
@@ -4539,7 +4564,7 @@
           <a:p>
             <a:fld id="{2BED0D0C-FD69-484B-864E-E341E636C72D}" type="datetimeFigureOut">
               <a:rPr lang="en-US" smtClean="0"/>
-              <a:t>10/23/2020</a:t>
+              <a:t>11/6/2020</a:t>
             </a:fld>
             <a:endParaRPr lang="en-US"/>
           </a:p>
@@ -4768,7 +4793,7 @@
           <a:p>
             <a:fld id="{2BED0D0C-FD69-484B-864E-E341E636C72D}" type="datetimeFigureOut">
               <a:rPr lang="en-US" smtClean="0"/>
-              <a:t>10/23/2020</a:t>
+              <a:t>11/6/2020</a:t>
             </a:fld>
             <a:endParaRPr lang="en-US"/>
           </a:p>
@@ -5132,7 +5157,7 @@
           <a:p>
             <a:fld id="{2BED0D0C-FD69-484B-864E-E341E636C72D}" type="datetimeFigureOut">
               <a:rPr lang="en-US" smtClean="0"/>
-              <a:t>10/23/2020</a:t>
+              <a:t>11/6/2020</a:t>
             </a:fld>
             <a:endParaRPr lang="en-US"/>
           </a:p>
@@ -5249,7 +5274,7 @@
           <a:p>
             <a:fld id="{2BED0D0C-FD69-484B-864E-E341E636C72D}" type="datetimeFigureOut">
               <a:rPr lang="en-US" smtClean="0"/>
-              <a:t>10/23/2020</a:t>
+              <a:t>11/6/2020</a:t>
             </a:fld>
             <a:endParaRPr lang="en-US"/>
           </a:p>
@@ -5344,7 +5369,7 @@
           <a:p>
             <a:fld id="{2BED0D0C-FD69-484B-864E-E341E636C72D}" type="datetimeFigureOut">
               <a:rPr lang="en-US" smtClean="0"/>
-              <a:t>10/23/2020</a:t>
+              <a:t>11/6/2020</a:t>
             </a:fld>
             <a:endParaRPr lang="en-US"/>
           </a:p>
@@ -5619,7 +5644,7 @@
           <a:p>
             <a:fld id="{2BED0D0C-FD69-484B-864E-E341E636C72D}" type="datetimeFigureOut">
               <a:rPr lang="en-US" smtClean="0"/>
-              <a:t>10/23/2020</a:t>
+              <a:t>11/6/2020</a:t>
             </a:fld>
             <a:endParaRPr lang="en-US"/>
           </a:p>
@@ -5871,7 +5896,7 @@
           <a:p>
             <a:fld id="{2BED0D0C-FD69-484B-864E-E341E636C72D}" type="datetimeFigureOut">
               <a:rPr lang="en-US" smtClean="0"/>
-              <a:t>10/23/2020</a:t>
+              <a:t>11/6/2020</a:t>
             </a:fld>
             <a:endParaRPr lang="en-US"/>
           </a:p>
@@ -6082,7 +6107,7 @@
           <a:p>
             <a:fld id="{2BED0D0C-FD69-484B-864E-E341E636C72D}" type="datetimeFigureOut">
               <a:rPr lang="en-US" smtClean="0"/>
-              <a:t>10/23/2020</a:t>
+              <a:t>11/6/2020</a:t>
             </a:fld>
             <a:endParaRPr lang="en-US"/>
           </a:p>
@@ -6503,7 +6528,7 @@
                 <a16:creationId xmlns:a16="http://schemas.microsoft.com/office/drawing/2014/main" id="{7905BA41-EE6E-4F80-8636-447F22DD729A}"/>
               </a:ext>
               <a:ext uri="{C183D7F6-B498-43B3-948B-1728B52AA6E4}">
-                <adec:decorative xmlns:adec="http://schemas.microsoft.com/office/drawing/2017/decorative" val="1"/>
+                <adec:decorative xmlns:adec="http://schemas.microsoft.com/office/drawing/2017/decorative" xmlns="" val="1"/>
               </a:ext>
             </a:extLst>
           </p:cNvPr>
@@ -6661,7 +6686,7 @@
                 <a16:creationId xmlns:a16="http://schemas.microsoft.com/office/drawing/2014/main" id="{CD7549B2-EE05-4558-8C64-AC46755F2B25}"/>
               </a:ext>
               <a:ext uri="{C183D7F6-B498-43B3-948B-1728B52AA6E4}">
-                <adec:decorative xmlns:adec="http://schemas.microsoft.com/office/drawing/2017/decorative" val="1"/>
+                <adec:decorative xmlns:adec="http://schemas.microsoft.com/office/drawing/2017/decorative" xmlns="" val="1"/>
               </a:ext>
             </a:extLst>
           </p:cNvPr>
@@ -6762,13 +6787,13 @@
           <p:nvPr/>
         </p:nvPicPr>
         <p:blipFill>
-          <a:blip r:embed="rId2">
+          <a:blip r:embed="rId2" cstate="print">
             <a:extLst>
               <a:ext uri="{28A0092B-C50C-407E-A947-70E740481C1C}">
                 <a14:useLocalDpi xmlns:a14="http://schemas.microsoft.com/office/drawing/2010/main" val="0"/>
               </a:ext>
               <a:ext uri="{96DAC541-7B7A-43D3-8B79-37D633B846F1}">
-                <asvg:svgBlip xmlns:asvg="http://schemas.microsoft.com/office/drawing/2016/SVG/main" r:embed="rId3"/>
+                <asvg:svgBlip xmlns:asvg="http://schemas.microsoft.com/office/drawing/2016/SVG/main" xmlns="" r:embed="rId3"/>
               </a:ext>
             </a:extLst>
           </a:blip>
@@ -6832,7 +6857,7 @@
                 <a16:creationId xmlns:a16="http://schemas.microsoft.com/office/drawing/2014/main" id="{827B839B-9ADE-406B-8590-F1CAEDED45A1}"/>
               </a:ext>
               <a:ext uri="{C183D7F6-B498-43B3-948B-1728B52AA6E4}">
-                <adec:decorative xmlns:adec="http://schemas.microsoft.com/office/drawing/2017/decorative" val="1"/>
+                <adec:decorative xmlns:adec="http://schemas.microsoft.com/office/drawing/2017/decorative" xmlns="" val="1"/>
               </a:ext>
             </a:extLst>
           </p:cNvPr>
@@ -6892,7 +6917,7 @@
                 <a16:creationId xmlns:a16="http://schemas.microsoft.com/office/drawing/2014/main" id="{CFE45BF0-46DB-408C-B5F7-7B11716805D4}"/>
               </a:ext>
               <a:ext uri="{C183D7F6-B498-43B3-948B-1728B52AA6E4}">
-                <adec:decorative xmlns:adec="http://schemas.microsoft.com/office/drawing/2017/decorative" val="1"/>
+                <adec:decorative xmlns:adec="http://schemas.microsoft.com/office/drawing/2017/decorative" xmlns="" val="1"/>
               </a:ext>
             </a:extLst>
           </p:cNvPr>
@@ -6995,7 +7020,7 @@
                 <a16:creationId xmlns:a16="http://schemas.microsoft.com/office/drawing/2014/main" id="{2AEBC8F2-97B1-41B4-93F1-2D289E197FBA}"/>
               </a:ext>
               <a:ext uri="{C183D7F6-B498-43B3-948B-1728B52AA6E4}">
-                <adec:decorative xmlns:adec="http://schemas.microsoft.com/office/drawing/2017/decorative" val="1"/>
+                <adec:decorative xmlns:adec="http://schemas.microsoft.com/office/drawing/2017/decorative" xmlns="" val="1"/>
               </a:ext>
             </a:extLst>
           </p:cNvPr>
@@ -7098,7 +7123,7 @@
                 <a16:creationId xmlns:a16="http://schemas.microsoft.com/office/drawing/2014/main" id="{472E3A19-F5D5-48FC-BB9C-48C2F68F598B}"/>
               </a:ext>
               <a:ext uri="{C183D7F6-B498-43B3-948B-1728B52AA6E4}">
-                <adec:decorative xmlns:adec="http://schemas.microsoft.com/office/drawing/2017/decorative" val="1"/>
+                <adec:decorative xmlns:adec="http://schemas.microsoft.com/office/drawing/2017/decorative" xmlns="" val="1"/>
               </a:ext>
             </a:extLst>
           </p:cNvPr>
@@ -7201,7 +7226,7 @@
                 <a16:creationId xmlns:a16="http://schemas.microsoft.com/office/drawing/2014/main" id="{7A62E32F-BB65-43A8-8EB5-92346890E549}"/>
               </a:ext>
               <a:ext uri="{C183D7F6-B498-43B3-948B-1728B52AA6E4}">
-                <adec:decorative xmlns:adec="http://schemas.microsoft.com/office/drawing/2017/decorative" val="1"/>
+                <adec:decorative xmlns:adec="http://schemas.microsoft.com/office/drawing/2017/decorative" xmlns="" val="1"/>
               </a:ext>
             </a:extLst>
           </p:cNvPr>
@@ -7304,7 +7329,7 @@
                 <a16:creationId xmlns:a16="http://schemas.microsoft.com/office/drawing/2014/main" id="{14E91B64-9FCC-451E-AFB4-A827D6329367}"/>
               </a:ext>
               <a:ext uri="{C183D7F6-B498-43B3-948B-1728B52AA6E4}">
-                <adec:decorative xmlns:adec="http://schemas.microsoft.com/office/drawing/2017/decorative" val="1"/>
+                <adec:decorative xmlns:adec="http://schemas.microsoft.com/office/drawing/2017/decorative" xmlns="" val="1"/>
               </a:ext>
             </a:extLst>
           </p:cNvPr>
@@ -7472,7 +7497,7 @@
                 <a16:creationId xmlns:a16="http://schemas.microsoft.com/office/drawing/2014/main" id="{827B839B-9ADE-406B-8590-F1CAEDED45A1}"/>
               </a:ext>
               <a:ext uri="{C183D7F6-B498-43B3-948B-1728B52AA6E4}">
-                <adec:decorative xmlns:adec="http://schemas.microsoft.com/office/drawing/2017/decorative" val="1"/>
+                <adec:decorative xmlns:adec="http://schemas.microsoft.com/office/drawing/2017/decorative" xmlns="" val="1"/>
               </a:ext>
             </a:extLst>
           </p:cNvPr>
@@ -7532,7 +7557,7 @@
                 <a16:creationId xmlns:a16="http://schemas.microsoft.com/office/drawing/2014/main" id="{CFE45BF0-46DB-408C-B5F7-7B11716805D4}"/>
               </a:ext>
               <a:ext uri="{C183D7F6-B498-43B3-948B-1728B52AA6E4}">
-                <adec:decorative xmlns:adec="http://schemas.microsoft.com/office/drawing/2017/decorative" val="1"/>
+                <adec:decorative xmlns:adec="http://schemas.microsoft.com/office/drawing/2017/decorative" xmlns="" val="1"/>
               </a:ext>
             </a:extLst>
           </p:cNvPr>
@@ -7635,7 +7660,7 @@
                 <a16:creationId xmlns:a16="http://schemas.microsoft.com/office/drawing/2014/main" id="{2AEBC8F2-97B1-41B4-93F1-2D289E197FBA}"/>
               </a:ext>
               <a:ext uri="{C183D7F6-B498-43B3-948B-1728B52AA6E4}">
-                <adec:decorative xmlns:adec="http://schemas.microsoft.com/office/drawing/2017/decorative" val="1"/>
+                <adec:decorative xmlns:adec="http://schemas.microsoft.com/office/drawing/2017/decorative" xmlns="" val="1"/>
               </a:ext>
             </a:extLst>
           </p:cNvPr>
@@ -7738,7 +7763,7 @@
                 <a16:creationId xmlns:a16="http://schemas.microsoft.com/office/drawing/2014/main" id="{472E3A19-F5D5-48FC-BB9C-48C2F68F598B}"/>
               </a:ext>
               <a:ext uri="{C183D7F6-B498-43B3-948B-1728B52AA6E4}">
-                <adec:decorative xmlns:adec="http://schemas.microsoft.com/office/drawing/2017/decorative" val="1"/>
+                <adec:decorative xmlns:adec="http://schemas.microsoft.com/office/drawing/2017/decorative" xmlns="" val="1"/>
               </a:ext>
             </a:extLst>
           </p:cNvPr>
@@ -7841,7 +7866,7 @@
                 <a16:creationId xmlns:a16="http://schemas.microsoft.com/office/drawing/2014/main" id="{7A62E32F-BB65-43A8-8EB5-92346890E549}"/>
               </a:ext>
               <a:ext uri="{C183D7F6-B498-43B3-948B-1728B52AA6E4}">
-                <adec:decorative xmlns:adec="http://schemas.microsoft.com/office/drawing/2017/decorative" val="1"/>
+                <adec:decorative xmlns:adec="http://schemas.microsoft.com/office/drawing/2017/decorative" xmlns="" val="1"/>
               </a:ext>
             </a:extLst>
           </p:cNvPr>
@@ -7944,7 +7969,7 @@
                 <a16:creationId xmlns:a16="http://schemas.microsoft.com/office/drawing/2014/main" id="{14E91B64-9FCC-451E-AFB4-A827D6329367}"/>
               </a:ext>
               <a:ext uri="{C183D7F6-B498-43B3-948B-1728B52AA6E4}">
-                <adec:decorative xmlns:adec="http://schemas.microsoft.com/office/drawing/2017/decorative" val="1"/>
+                <adec:decorative xmlns:adec="http://schemas.microsoft.com/office/drawing/2017/decorative" xmlns="" val="1"/>
               </a:ext>
             </a:extLst>
           </p:cNvPr>
@@ -8045,7 +8070,7 @@
               <a:buNone/>
             </a:pPr>
             <a:r>
-              <a:rPr lang="en-US" sz="2400"/>
+              <a:rPr lang="en-US" sz="2400" dirty="0"/>
               <a:t>I want to take the opportunity to thank several people who made this project possible:</a:t>
             </a:r>
           </a:p>
@@ -8053,30 +8078,75 @@
             <a:pPr marL="0" indent="0">
               <a:buNone/>
             </a:pPr>
-            <a:endParaRPr lang="en-US" sz="2400"/>
-          </a:p>
-          <a:p>
+            <a:endParaRPr lang="en-US" sz="2400" dirty="0"/>
+          </a:p>
+          <a:p>
+            <a:r>
+              <a:rPr lang="en-US" sz="2400" dirty="0" err="1"/>
+              <a:t>Matthijs</a:t>
+            </a:r>
+            <a:r>
+              <a:rPr lang="en-US" sz="2400" dirty="0"/>
+              <a:t> </a:t>
+            </a:r>
             <a:r>
               <a:rPr lang="en-US" sz="2400"/>
-              <a:t>Matthijs van Ween and Saxion</a:t>
+              <a:t>van </a:t>
             </a:r>
-          </a:p>
-          <a:p>
             <a:r>
-              <a:rPr lang="en-US" sz="2400"/>
-              <a:t>Jeroen van der Wel and Thales</a:t>
+              <a:rPr lang="en-US" sz="2400" smtClean="0"/>
+              <a:t>Veen and </a:t>
             </a:r>
-          </a:p>
-          <a:p>
             <a:r>
-              <a:rPr lang="en-US" sz="2400"/>
-              <a:t>Gregory Jones, Chris Mcleod and NVIDIA</a:t>
+              <a:rPr lang="en-US" sz="2400" dirty="0" err="1"/>
+              <a:t>Saxion</a:t>
             </a:r>
+            <a:endParaRPr lang="en-US" sz="2400" dirty="0"/>
           </a:p>
           <a:p>
             <a:r>
-              <a:rPr lang="en-US" sz="2400"/>
-              <a:t>Vincent van Wingerden and Microsoft Azure</a:t>
+              <a:rPr lang="en-US" sz="2400" dirty="0" err="1"/>
+              <a:t>Jeroen</a:t>
+            </a:r>
+            <a:r>
+              <a:rPr lang="en-US" sz="2400" dirty="0"/>
+              <a:t> van der </a:t>
+            </a:r>
+            <a:r>
+              <a:rPr lang="en-US" sz="2400" dirty="0" err="1"/>
+              <a:t>Wel</a:t>
+            </a:r>
+            <a:r>
+              <a:rPr lang="en-US" sz="2400" dirty="0"/>
+              <a:t> and Thales</a:t>
+            </a:r>
+          </a:p>
+          <a:p>
+            <a:r>
+              <a:rPr lang="en-US" sz="2400" dirty="0"/>
+              <a:t>Gregory Jones, Chris </a:t>
+            </a:r>
+            <a:r>
+              <a:rPr lang="en-US" sz="2400" dirty="0" err="1"/>
+              <a:t>Mcleod</a:t>
+            </a:r>
+            <a:r>
+              <a:rPr lang="en-US" sz="2400" dirty="0"/>
+              <a:t> and NVIDIA</a:t>
+            </a:r>
+          </a:p>
+          <a:p>
+            <a:r>
+              <a:rPr lang="en-US" sz="2400" dirty="0"/>
+              <a:t>Vincent van </a:t>
+            </a:r>
+            <a:r>
+              <a:rPr lang="en-US" sz="2400" dirty="0" err="1"/>
+              <a:t>Wingerden</a:t>
+            </a:r>
+            <a:r>
+              <a:rPr lang="en-US" sz="2400" dirty="0"/>
+              <a:t> and Microsoft Azure</a:t>
             </a:r>
           </a:p>
         </p:txBody>
@@ -8127,7 +8197,7 @@
                 <a16:creationId xmlns:a16="http://schemas.microsoft.com/office/drawing/2014/main" id="{029DE7B6-DC7C-4BA1-B406-EDDA0C0A31C4}"/>
               </a:ext>
               <a:ext uri="{C183D7F6-B498-43B3-948B-1728B52AA6E4}">
-                <adec:decorative xmlns:adec="http://schemas.microsoft.com/office/drawing/2017/decorative" val="1"/>
+                <adec:decorative xmlns:adec="http://schemas.microsoft.com/office/drawing/2017/decorative" xmlns="" val="1"/>
               </a:ext>
             </a:extLst>
           </p:cNvPr>
@@ -8268,7 +8338,7 @@
                 <a14:useLocalDpi xmlns:a14="http://schemas.microsoft.com/office/drawing/2010/main" val="0"/>
               </a:ext>
               <a:ext uri="{96DAC541-7B7A-43D3-8B79-37D633B846F1}">
-                <asvg:svgBlip xmlns:asvg="http://schemas.microsoft.com/office/drawing/2016/SVG/main" r:embed="rId3"/>
+                <asvg:svgBlip xmlns:asvg="http://schemas.microsoft.com/office/drawing/2016/SVG/main" xmlns="" r:embed="rId3"/>
               </a:ext>
             </a:extLst>
           </a:blip>
@@ -8332,7 +8402,7 @@
                 <a16:creationId xmlns:a16="http://schemas.microsoft.com/office/drawing/2014/main" id="{827B839B-9ADE-406B-8590-F1CAEDED45A1}"/>
               </a:ext>
               <a:ext uri="{C183D7F6-B498-43B3-948B-1728B52AA6E4}">
-                <adec:decorative xmlns:adec="http://schemas.microsoft.com/office/drawing/2017/decorative" val="1"/>
+                <adec:decorative xmlns:adec="http://schemas.microsoft.com/office/drawing/2017/decorative" xmlns="" val="1"/>
               </a:ext>
             </a:extLst>
           </p:cNvPr>
@@ -8392,7 +8462,7 @@
                 <a16:creationId xmlns:a16="http://schemas.microsoft.com/office/drawing/2014/main" id="{CFE45BF0-46DB-408C-B5F7-7B11716805D4}"/>
               </a:ext>
               <a:ext uri="{C183D7F6-B498-43B3-948B-1728B52AA6E4}">
-                <adec:decorative xmlns:adec="http://schemas.microsoft.com/office/drawing/2017/decorative" val="1"/>
+                <adec:decorative xmlns:adec="http://schemas.microsoft.com/office/drawing/2017/decorative" xmlns="" val="1"/>
               </a:ext>
             </a:extLst>
           </p:cNvPr>
@@ -8495,7 +8565,7 @@
                 <a16:creationId xmlns:a16="http://schemas.microsoft.com/office/drawing/2014/main" id="{2AEBC8F2-97B1-41B4-93F1-2D289E197FBA}"/>
               </a:ext>
               <a:ext uri="{C183D7F6-B498-43B3-948B-1728B52AA6E4}">
-                <adec:decorative xmlns:adec="http://schemas.microsoft.com/office/drawing/2017/decorative" val="1"/>
+                <adec:decorative xmlns:adec="http://schemas.microsoft.com/office/drawing/2017/decorative" xmlns="" val="1"/>
               </a:ext>
             </a:extLst>
           </p:cNvPr>
@@ -8598,7 +8668,7 @@
                 <a16:creationId xmlns:a16="http://schemas.microsoft.com/office/drawing/2014/main" id="{472E3A19-F5D5-48FC-BB9C-48C2F68F598B}"/>
               </a:ext>
               <a:ext uri="{C183D7F6-B498-43B3-948B-1728B52AA6E4}">
-                <adec:decorative xmlns:adec="http://schemas.microsoft.com/office/drawing/2017/decorative" val="1"/>
+                <adec:decorative xmlns:adec="http://schemas.microsoft.com/office/drawing/2017/decorative" xmlns="" val="1"/>
               </a:ext>
             </a:extLst>
           </p:cNvPr>
@@ -8701,7 +8771,7 @@
                 <a16:creationId xmlns:a16="http://schemas.microsoft.com/office/drawing/2014/main" id="{7A62E32F-BB65-43A8-8EB5-92346890E549}"/>
               </a:ext>
               <a:ext uri="{C183D7F6-B498-43B3-948B-1728B52AA6E4}">
-                <adec:decorative xmlns:adec="http://schemas.microsoft.com/office/drawing/2017/decorative" val="1"/>
+                <adec:decorative xmlns:adec="http://schemas.microsoft.com/office/drawing/2017/decorative" xmlns="" val="1"/>
               </a:ext>
             </a:extLst>
           </p:cNvPr>
@@ -8804,7 +8874,7 @@
                 <a16:creationId xmlns:a16="http://schemas.microsoft.com/office/drawing/2014/main" id="{14E91B64-9FCC-451E-AFB4-A827D6329367}"/>
               </a:ext>
               <a:ext uri="{C183D7F6-B498-43B3-948B-1728B52AA6E4}">
-                <adec:decorative xmlns:adec="http://schemas.microsoft.com/office/drawing/2017/decorative" val="1"/>
+                <adec:decorative xmlns:adec="http://schemas.microsoft.com/office/drawing/2017/decorative" xmlns="" val="1"/>
               </a:ext>
             </a:extLst>
           </p:cNvPr>
@@ -9189,7 +9259,7 @@
                 <a16:creationId xmlns:a16="http://schemas.microsoft.com/office/drawing/2014/main" id="{827B839B-9ADE-406B-8590-F1CAEDED45A1}"/>
               </a:ext>
               <a:ext uri="{C183D7F6-B498-43B3-948B-1728B52AA6E4}">
-                <adec:decorative xmlns:adec="http://schemas.microsoft.com/office/drawing/2017/decorative" val="1"/>
+                <adec:decorative xmlns:adec="http://schemas.microsoft.com/office/drawing/2017/decorative" xmlns="" val="1"/>
               </a:ext>
             </a:extLst>
           </p:cNvPr>
@@ -9249,7 +9319,7 @@
                 <a16:creationId xmlns:a16="http://schemas.microsoft.com/office/drawing/2014/main" id="{CFE45BF0-46DB-408C-B5F7-7B11716805D4}"/>
               </a:ext>
               <a:ext uri="{C183D7F6-B498-43B3-948B-1728B52AA6E4}">
-                <adec:decorative xmlns:adec="http://schemas.microsoft.com/office/drawing/2017/decorative" val="1"/>
+                <adec:decorative xmlns:adec="http://schemas.microsoft.com/office/drawing/2017/decorative" xmlns="" val="1"/>
               </a:ext>
             </a:extLst>
           </p:cNvPr>
@@ -9352,7 +9422,7 @@
                 <a16:creationId xmlns:a16="http://schemas.microsoft.com/office/drawing/2014/main" id="{2AEBC8F2-97B1-41B4-93F1-2D289E197FBA}"/>
               </a:ext>
               <a:ext uri="{C183D7F6-B498-43B3-948B-1728B52AA6E4}">
-                <adec:decorative xmlns:adec="http://schemas.microsoft.com/office/drawing/2017/decorative" val="1"/>
+                <adec:decorative xmlns:adec="http://schemas.microsoft.com/office/drawing/2017/decorative" xmlns="" val="1"/>
               </a:ext>
             </a:extLst>
           </p:cNvPr>
@@ -9455,7 +9525,7 @@
                 <a16:creationId xmlns:a16="http://schemas.microsoft.com/office/drawing/2014/main" id="{472E3A19-F5D5-48FC-BB9C-48C2F68F598B}"/>
               </a:ext>
               <a:ext uri="{C183D7F6-B498-43B3-948B-1728B52AA6E4}">
-                <adec:decorative xmlns:adec="http://schemas.microsoft.com/office/drawing/2017/decorative" val="1"/>
+                <adec:decorative xmlns:adec="http://schemas.microsoft.com/office/drawing/2017/decorative" xmlns="" val="1"/>
               </a:ext>
             </a:extLst>
           </p:cNvPr>
@@ -9558,7 +9628,7 @@
                 <a16:creationId xmlns:a16="http://schemas.microsoft.com/office/drawing/2014/main" id="{7A62E32F-BB65-43A8-8EB5-92346890E549}"/>
               </a:ext>
               <a:ext uri="{C183D7F6-B498-43B3-948B-1728B52AA6E4}">
-                <adec:decorative xmlns:adec="http://schemas.microsoft.com/office/drawing/2017/decorative" val="1"/>
+                <adec:decorative xmlns:adec="http://schemas.microsoft.com/office/drawing/2017/decorative" xmlns="" val="1"/>
               </a:ext>
             </a:extLst>
           </p:cNvPr>
@@ -9661,7 +9731,7 @@
                 <a16:creationId xmlns:a16="http://schemas.microsoft.com/office/drawing/2014/main" id="{14E91B64-9FCC-451E-AFB4-A827D6329367}"/>
               </a:ext>
               <a:ext uri="{C183D7F6-B498-43B3-948B-1728B52AA6E4}">
-                <adec:decorative xmlns:adec="http://schemas.microsoft.com/office/drawing/2017/decorative" val="1"/>
+                <adec:decorative xmlns:adec="http://schemas.microsoft.com/office/drawing/2017/decorative" xmlns="" val="1"/>
               </a:ext>
             </a:extLst>
           </p:cNvPr>
@@ -9838,7 +9908,7 @@
                 <a16:creationId xmlns:a16="http://schemas.microsoft.com/office/drawing/2014/main" id="{B0A19BDA-40B6-4DE7-81A4-6B1F1E40A64B}"/>
               </a:ext>
               <a:ext uri="{C183D7F6-B498-43B3-948B-1728B52AA6E4}">
-                <adec:decorative xmlns:adec="http://schemas.microsoft.com/office/drawing/2017/decorative" val="1"/>
+                <adec:decorative xmlns:adec="http://schemas.microsoft.com/office/drawing/2017/decorative" xmlns="" val="1"/>
               </a:ext>
             </a:extLst>
           </p:cNvPr>
@@ -9898,7 +9968,7 @@
                 <a16:creationId xmlns:a16="http://schemas.microsoft.com/office/drawing/2014/main" id="{0A628AD8-1356-4BF5-8A59-3549B2C7C013}"/>
               </a:ext>
               <a:ext uri="{C183D7F6-B498-43B3-948B-1728B52AA6E4}">
-                <adec:decorative xmlns:adec="http://schemas.microsoft.com/office/drawing/2017/decorative" val="1"/>
+                <adec:decorative xmlns:adec="http://schemas.microsoft.com/office/drawing/2017/decorative" xmlns="" val="1"/>
               </a:ext>
             </a:extLst>
           </p:cNvPr>
@@ -10001,7 +10071,7 @@
                 <a16:creationId xmlns:a16="http://schemas.microsoft.com/office/drawing/2014/main" id="{9F2E6F73-36C2-4E56-AB0C-4D6936FF5D52}"/>
               </a:ext>
               <a:ext uri="{C183D7F6-B498-43B3-948B-1728B52AA6E4}">
-                <adec:decorative xmlns:adec="http://schemas.microsoft.com/office/drawing/2017/decorative" val="1"/>
+                <adec:decorative xmlns:adec="http://schemas.microsoft.com/office/drawing/2017/decorative" xmlns="" val="1"/>
               </a:ext>
             </a:extLst>
           </p:cNvPr>
@@ -10104,7 +10174,7 @@
                 <a16:creationId xmlns:a16="http://schemas.microsoft.com/office/drawing/2014/main" id="{8AA5DD19-98A6-4E28-999C-2C074B9CBFAC}"/>
               </a:ext>
               <a:ext uri="{C183D7F6-B498-43B3-948B-1728B52AA6E4}">
-                <adec:decorative xmlns:adec="http://schemas.microsoft.com/office/drawing/2017/decorative" val="1"/>
+                <adec:decorative xmlns:adec="http://schemas.microsoft.com/office/drawing/2017/decorative" xmlns="" val="1"/>
               </a:ext>
             </a:extLst>
           </p:cNvPr>
@@ -10207,7 +10277,7 @@
                 <a16:creationId xmlns:a16="http://schemas.microsoft.com/office/drawing/2014/main" id="{5F24A71D-C0A9-49AC-B2D1-5A9EA2BD383E}"/>
               </a:ext>
               <a:ext uri="{C183D7F6-B498-43B3-948B-1728B52AA6E4}">
-                <adec:decorative xmlns:adec="http://schemas.microsoft.com/office/drawing/2017/decorative" val="1"/>
+                <adec:decorative xmlns:adec="http://schemas.microsoft.com/office/drawing/2017/decorative" xmlns="" val="1"/>
               </a:ext>
             </a:extLst>
           </p:cNvPr>
@@ -10310,7 +10380,7 @@
                 <a16:creationId xmlns:a16="http://schemas.microsoft.com/office/drawing/2014/main" id="{99535B11-4A49-4A02-9CB6-3F8A6012892C}"/>
               </a:ext>
               <a:ext uri="{C183D7F6-B498-43B3-948B-1728B52AA6E4}">
-                <adec:decorative xmlns:adec="http://schemas.microsoft.com/office/drawing/2017/decorative" val="1"/>
+                <adec:decorative xmlns:adec="http://schemas.microsoft.com/office/drawing/2017/decorative" xmlns="" val="1"/>
               </a:ext>
             </a:extLst>
           </p:cNvPr>
@@ -10394,7 +10464,7 @@
           <p:nvPr/>
         </p:nvPicPr>
         <p:blipFill>
-          <a:blip r:embed="rId2">
+          <a:blip r:embed="rId2" cstate="print">
             <a:extLst>
               <a:ext uri="{28A0092B-C50C-407E-A947-70E740481C1C}">
                 <a14:useLocalDpi xmlns:a14="http://schemas.microsoft.com/office/drawing/2010/main" val="0"/>
@@ -10594,7 +10664,7 @@
                 <a16:creationId xmlns:a16="http://schemas.microsoft.com/office/drawing/2014/main" id="{827B839B-9ADE-406B-8590-F1CAEDED45A1}"/>
               </a:ext>
               <a:ext uri="{C183D7F6-B498-43B3-948B-1728B52AA6E4}">
-                <adec:decorative xmlns:adec="http://schemas.microsoft.com/office/drawing/2017/decorative" val="1"/>
+                <adec:decorative xmlns:adec="http://schemas.microsoft.com/office/drawing/2017/decorative" xmlns="" val="1"/>
               </a:ext>
             </a:extLst>
           </p:cNvPr>
@@ -10654,7 +10724,7 @@
                 <a16:creationId xmlns:a16="http://schemas.microsoft.com/office/drawing/2014/main" id="{CFE45BF0-46DB-408C-B5F7-7B11716805D4}"/>
               </a:ext>
               <a:ext uri="{C183D7F6-B498-43B3-948B-1728B52AA6E4}">
-                <adec:decorative xmlns:adec="http://schemas.microsoft.com/office/drawing/2017/decorative" val="1"/>
+                <adec:decorative xmlns:adec="http://schemas.microsoft.com/office/drawing/2017/decorative" xmlns="" val="1"/>
               </a:ext>
             </a:extLst>
           </p:cNvPr>
@@ -10757,7 +10827,7 @@
                 <a16:creationId xmlns:a16="http://schemas.microsoft.com/office/drawing/2014/main" id="{2AEBC8F2-97B1-41B4-93F1-2D289E197FBA}"/>
               </a:ext>
               <a:ext uri="{C183D7F6-B498-43B3-948B-1728B52AA6E4}">
-                <adec:decorative xmlns:adec="http://schemas.microsoft.com/office/drawing/2017/decorative" val="1"/>
+                <adec:decorative xmlns:adec="http://schemas.microsoft.com/office/drawing/2017/decorative" xmlns="" val="1"/>
               </a:ext>
             </a:extLst>
           </p:cNvPr>
@@ -10860,7 +10930,7 @@
                 <a16:creationId xmlns:a16="http://schemas.microsoft.com/office/drawing/2014/main" id="{472E3A19-F5D5-48FC-BB9C-48C2F68F598B}"/>
               </a:ext>
               <a:ext uri="{C183D7F6-B498-43B3-948B-1728B52AA6E4}">
-                <adec:decorative xmlns:adec="http://schemas.microsoft.com/office/drawing/2017/decorative" val="1"/>
+                <adec:decorative xmlns:adec="http://schemas.microsoft.com/office/drawing/2017/decorative" xmlns="" val="1"/>
               </a:ext>
             </a:extLst>
           </p:cNvPr>
@@ -10963,7 +11033,7 @@
                 <a16:creationId xmlns:a16="http://schemas.microsoft.com/office/drawing/2014/main" id="{7A62E32F-BB65-43A8-8EB5-92346890E549}"/>
               </a:ext>
               <a:ext uri="{C183D7F6-B498-43B3-948B-1728B52AA6E4}">
-                <adec:decorative xmlns:adec="http://schemas.microsoft.com/office/drawing/2017/decorative" val="1"/>
+                <adec:decorative xmlns:adec="http://schemas.microsoft.com/office/drawing/2017/decorative" xmlns="" val="1"/>
               </a:ext>
             </a:extLst>
           </p:cNvPr>
@@ -11066,7 +11136,7 @@
                 <a16:creationId xmlns:a16="http://schemas.microsoft.com/office/drawing/2014/main" id="{14E91B64-9FCC-451E-AFB4-A827D6329367}"/>
               </a:ext>
               <a:ext uri="{C183D7F6-B498-43B3-948B-1728B52AA6E4}">
-                <adec:decorative xmlns:adec="http://schemas.microsoft.com/office/drawing/2017/decorative" val="1"/>
+                <adec:decorative xmlns:adec="http://schemas.microsoft.com/office/drawing/2017/decorative" xmlns="" val="1"/>
               </a:ext>
             </a:extLst>
           </p:cNvPr>
@@ -11253,7 +11323,7 @@
                 <a16:creationId xmlns:a16="http://schemas.microsoft.com/office/drawing/2014/main" id="{F4C0B10B-D2C4-4A54-AFAD-3D27DF88BB37}"/>
               </a:ext>
               <a:ext uri="{C183D7F6-B498-43B3-948B-1728B52AA6E4}">
-                <adec:decorative xmlns:adec="http://schemas.microsoft.com/office/drawing/2017/decorative" val="1"/>
+                <adec:decorative xmlns:adec="http://schemas.microsoft.com/office/drawing/2017/decorative" xmlns="" val="1"/>
               </a:ext>
             </a:extLst>
           </p:cNvPr>
@@ -11313,7 +11383,7 @@
                 <a16:creationId xmlns:a16="http://schemas.microsoft.com/office/drawing/2014/main" id="{B6BADB90-C74B-40D6-86DC-503F65FCE8DC}"/>
               </a:ext>
               <a:ext uri="{C183D7F6-B498-43B3-948B-1728B52AA6E4}">
-                <adec:decorative xmlns:adec="http://schemas.microsoft.com/office/drawing/2017/decorative" val="1"/>
+                <adec:decorative xmlns:adec="http://schemas.microsoft.com/office/drawing/2017/decorative" xmlns="" val="1"/>
               </a:ext>
             </a:extLst>
           </p:cNvPr>
@@ -11344,7 +11414,7 @@
                   <a16:creationId xmlns:a16="http://schemas.microsoft.com/office/drawing/2014/main" id="{6559431D-1886-4AE0-9B87-9AD2ECAB8439}"/>
                 </a:ext>
                 <a:ext uri="{C183D7F6-B498-43B3-948B-1728B52AA6E4}">
-                  <adec:decorative xmlns:adec="http://schemas.microsoft.com/office/drawing/2017/decorative" val="1"/>
+                  <adec:decorative xmlns:adec="http://schemas.microsoft.com/office/drawing/2017/decorative" xmlns="" val="1"/>
                 </a:ext>
               </a:extLst>
             </p:cNvPr>
@@ -11447,7 +11517,7 @@
                   <a16:creationId xmlns:a16="http://schemas.microsoft.com/office/drawing/2014/main" id="{373850A5-B04A-4FCD-9E73-EE322167FB31}"/>
                 </a:ext>
                 <a:ext uri="{C183D7F6-B498-43B3-948B-1728B52AA6E4}">
-                  <adec:decorative xmlns:adec="http://schemas.microsoft.com/office/drawing/2017/decorative" val="1"/>
+                  <adec:decorative xmlns:adec="http://schemas.microsoft.com/office/drawing/2017/decorative" xmlns="" val="1"/>
                 </a:ext>
               </a:extLst>
             </p:cNvPr>
@@ -11550,7 +11620,7 @@
                   <a16:creationId xmlns:a16="http://schemas.microsoft.com/office/drawing/2014/main" id="{82C18C67-80FA-4738-AA53-0AF2419F98E0}"/>
                 </a:ext>
                 <a:ext uri="{C183D7F6-B498-43B3-948B-1728B52AA6E4}">
-                  <adec:decorative xmlns:adec="http://schemas.microsoft.com/office/drawing/2017/decorative" val="1"/>
+                  <adec:decorative xmlns:adec="http://schemas.microsoft.com/office/drawing/2017/decorative" xmlns="" val="1"/>
                 </a:ext>
               </a:extLst>
             </p:cNvPr>
@@ -11653,7 +11723,7 @@
                   <a16:creationId xmlns:a16="http://schemas.microsoft.com/office/drawing/2014/main" id="{48543B1A-8BF5-4C63-8404-41B2EA70B33E}"/>
                 </a:ext>
                 <a:ext uri="{C183D7F6-B498-43B3-948B-1728B52AA6E4}">
-                  <adec:decorative xmlns:adec="http://schemas.microsoft.com/office/drawing/2017/decorative" val="1"/>
+                  <adec:decorative xmlns:adec="http://schemas.microsoft.com/office/drawing/2017/decorative" xmlns="" val="1"/>
                 </a:ext>
               </a:extLst>
             </p:cNvPr>
@@ -11756,7 +11826,7 @@
                   <a16:creationId xmlns:a16="http://schemas.microsoft.com/office/drawing/2014/main" id="{92DF5096-E051-498C-A3ED-CBA77A813AAC}"/>
                 </a:ext>
                 <a:ext uri="{C183D7F6-B498-43B3-948B-1728B52AA6E4}">
-                  <adec:decorative xmlns:adec="http://schemas.microsoft.com/office/drawing/2017/decorative" val="1"/>
+                  <adec:decorative xmlns:adec="http://schemas.microsoft.com/office/drawing/2017/decorative" xmlns="" val="1"/>
                 </a:ext>
               </a:extLst>
             </p:cNvPr>
@@ -12128,7 +12198,7 @@
                 <a16:creationId xmlns:a16="http://schemas.microsoft.com/office/drawing/2014/main" id="{827B839B-9ADE-406B-8590-F1CAEDED45A1}"/>
               </a:ext>
               <a:ext uri="{C183D7F6-B498-43B3-948B-1728B52AA6E4}">
-                <adec:decorative xmlns:adec="http://schemas.microsoft.com/office/drawing/2017/decorative" val="1"/>
+                <adec:decorative xmlns:adec="http://schemas.microsoft.com/office/drawing/2017/decorative" xmlns="" val="1"/>
               </a:ext>
             </a:extLst>
           </p:cNvPr>
@@ -12188,7 +12258,7 @@
                 <a16:creationId xmlns:a16="http://schemas.microsoft.com/office/drawing/2014/main" id="{CFE45BF0-46DB-408C-B5F7-7B11716805D4}"/>
               </a:ext>
               <a:ext uri="{C183D7F6-B498-43B3-948B-1728B52AA6E4}">
-                <adec:decorative xmlns:adec="http://schemas.microsoft.com/office/drawing/2017/decorative" val="1"/>
+                <adec:decorative xmlns:adec="http://schemas.microsoft.com/office/drawing/2017/decorative" xmlns="" val="1"/>
               </a:ext>
             </a:extLst>
           </p:cNvPr>
@@ -12291,7 +12361,7 @@
                 <a16:creationId xmlns:a16="http://schemas.microsoft.com/office/drawing/2014/main" id="{2AEBC8F2-97B1-41B4-93F1-2D289E197FBA}"/>
               </a:ext>
               <a:ext uri="{C183D7F6-B498-43B3-948B-1728B52AA6E4}">
-                <adec:decorative xmlns:adec="http://schemas.microsoft.com/office/drawing/2017/decorative" val="1"/>
+                <adec:decorative xmlns:adec="http://schemas.microsoft.com/office/drawing/2017/decorative" xmlns="" val="1"/>
               </a:ext>
             </a:extLst>
           </p:cNvPr>
@@ -12394,7 +12464,7 @@
                 <a16:creationId xmlns:a16="http://schemas.microsoft.com/office/drawing/2014/main" id="{472E3A19-F5D5-48FC-BB9C-48C2F68F598B}"/>
               </a:ext>
               <a:ext uri="{C183D7F6-B498-43B3-948B-1728B52AA6E4}">
-                <adec:decorative xmlns:adec="http://schemas.microsoft.com/office/drawing/2017/decorative" val="1"/>
+                <adec:decorative xmlns:adec="http://schemas.microsoft.com/office/drawing/2017/decorative" xmlns="" val="1"/>
               </a:ext>
             </a:extLst>
           </p:cNvPr>
@@ -12497,7 +12567,7 @@
                 <a16:creationId xmlns:a16="http://schemas.microsoft.com/office/drawing/2014/main" id="{7A62E32F-BB65-43A8-8EB5-92346890E549}"/>
               </a:ext>
               <a:ext uri="{C183D7F6-B498-43B3-948B-1728B52AA6E4}">
-                <adec:decorative xmlns:adec="http://schemas.microsoft.com/office/drawing/2017/decorative" val="1"/>
+                <adec:decorative xmlns:adec="http://schemas.microsoft.com/office/drawing/2017/decorative" xmlns="" val="1"/>
               </a:ext>
             </a:extLst>
           </p:cNvPr>
@@ -12600,7 +12670,7 @@
                 <a16:creationId xmlns:a16="http://schemas.microsoft.com/office/drawing/2014/main" id="{14E91B64-9FCC-451E-AFB4-A827D6329367}"/>
               </a:ext>
               <a:ext uri="{C183D7F6-B498-43B3-948B-1728B52AA6E4}">
-                <adec:decorative xmlns:adec="http://schemas.microsoft.com/office/drawing/2017/decorative" val="1"/>
+                <adec:decorative xmlns:adec="http://schemas.microsoft.com/office/drawing/2017/decorative" xmlns="" val="1"/>
               </a:ext>
             </a:extLst>
           </p:cNvPr>
@@ -12765,7 +12835,7 @@
                 <a16:creationId xmlns:a16="http://schemas.microsoft.com/office/drawing/2014/main" id="{B0A19BDA-40B6-4DE7-81A4-6B1F1E40A64B}"/>
               </a:ext>
               <a:ext uri="{C183D7F6-B498-43B3-948B-1728B52AA6E4}">
-                <adec:decorative xmlns:adec="http://schemas.microsoft.com/office/drawing/2017/decorative" val="1"/>
+                <adec:decorative xmlns:adec="http://schemas.microsoft.com/office/drawing/2017/decorative" xmlns="" val="1"/>
               </a:ext>
             </a:extLst>
           </p:cNvPr>
@@ -12825,7 +12895,7 @@
                 <a16:creationId xmlns:a16="http://schemas.microsoft.com/office/drawing/2014/main" id="{0A628AD8-1356-4BF5-8A59-3549B2C7C013}"/>
               </a:ext>
               <a:ext uri="{C183D7F6-B498-43B3-948B-1728B52AA6E4}">
-                <adec:decorative xmlns:adec="http://schemas.microsoft.com/office/drawing/2017/decorative" val="1"/>
+                <adec:decorative xmlns:adec="http://schemas.microsoft.com/office/drawing/2017/decorative" xmlns="" val="1"/>
               </a:ext>
             </a:extLst>
           </p:cNvPr>
@@ -12928,7 +12998,7 @@
                 <a16:creationId xmlns:a16="http://schemas.microsoft.com/office/drawing/2014/main" id="{9F2E6F73-36C2-4E56-AB0C-4D6936FF5D52}"/>
               </a:ext>
               <a:ext uri="{C183D7F6-B498-43B3-948B-1728B52AA6E4}">
-                <adec:decorative xmlns:adec="http://schemas.microsoft.com/office/drawing/2017/decorative" val="1"/>
+                <adec:decorative xmlns:adec="http://schemas.microsoft.com/office/drawing/2017/decorative" xmlns="" val="1"/>
               </a:ext>
             </a:extLst>
           </p:cNvPr>
@@ -13031,7 +13101,7 @@
                 <a16:creationId xmlns:a16="http://schemas.microsoft.com/office/drawing/2014/main" id="{8AA5DD19-98A6-4E28-999C-2C074B9CBFAC}"/>
               </a:ext>
               <a:ext uri="{C183D7F6-B498-43B3-948B-1728B52AA6E4}">
-                <adec:decorative xmlns:adec="http://schemas.microsoft.com/office/drawing/2017/decorative" val="1"/>
+                <adec:decorative xmlns:adec="http://schemas.microsoft.com/office/drawing/2017/decorative" xmlns="" val="1"/>
               </a:ext>
             </a:extLst>
           </p:cNvPr>
@@ -13134,7 +13204,7 @@
                 <a16:creationId xmlns:a16="http://schemas.microsoft.com/office/drawing/2014/main" id="{5F24A71D-C0A9-49AC-B2D1-5A9EA2BD383E}"/>
               </a:ext>
               <a:ext uri="{C183D7F6-B498-43B3-948B-1728B52AA6E4}">
-                <adec:decorative xmlns:adec="http://schemas.microsoft.com/office/drawing/2017/decorative" val="1"/>
+                <adec:decorative xmlns:adec="http://schemas.microsoft.com/office/drawing/2017/decorative" xmlns="" val="1"/>
               </a:ext>
             </a:extLst>
           </p:cNvPr>
@@ -13237,7 +13307,7 @@
                 <a16:creationId xmlns:a16="http://schemas.microsoft.com/office/drawing/2014/main" id="{99535B11-4A49-4A02-9CB6-3F8A6012892C}"/>
               </a:ext>
               <a:ext uri="{C183D7F6-B498-43B3-948B-1728B52AA6E4}">
-                <adec:decorative xmlns:adec="http://schemas.microsoft.com/office/drawing/2017/decorative" val="1"/>
+                <adec:decorative xmlns:adec="http://schemas.microsoft.com/office/drawing/2017/decorative" xmlns="" val="1"/>
               </a:ext>
             </a:extLst>
           </p:cNvPr>
@@ -13510,7 +13580,7 @@
                 <a16:creationId xmlns:a16="http://schemas.microsoft.com/office/drawing/2014/main" id="{1BE4F293-0A40-4AA3-8747-1C7D9F3EEABB}"/>
               </a:ext>
               <a:ext uri="{C183D7F6-B498-43B3-948B-1728B52AA6E4}">
-                <adec:decorative xmlns:adec="http://schemas.microsoft.com/office/drawing/2017/decorative" val="1"/>
+                <adec:decorative xmlns:adec="http://schemas.microsoft.com/office/drawing/2017/decorative" xmlns="" val="1"/>
               </a:ext>
             </a:extLst>
           </p:cNvPr>
@@ -13570,7 +13640,7 @@
                 <a16:creationId xmlns:a16="http://schemas.microsoft.com/office/drawing/2014/main" id="{5D1CC8B8-2CD1-45F6-9CED-CA310400222D}"/>
               </a:ext>
               <a:ext uri="{C183D7F6-B498-43B3-948B-1728B52AA6E4}">
-                <adec:decorative xmlns:adec="http://schemas.microsoft.com/office/drawing/2017/decorative" val="1"/>
+                <adec:decorative xmlns:adec="http://schemas.microsoft.com/office/drawing/2017/decorative" xmlns="" val="1"/>
               </a:ext>
             </a:extLst>
           </p:cNvPr>
@@ -13601,7 +13671,7 @@
                   <a16:creationId xmlns:a16="http://schemas.microsoft.com/office/drawing/2014/main" id="{D0486316-3F2D-434E-AF23-A8EDD6E78DD9}"/>
                 </a:ext>
                 <a:ext uri="{C183D7F6-B498-43B3-948B-1728B52AA6E4}">
-                  <adec:decorative xmlns:adec="http://schemas.microsoft.com/office/drawing/2017/decorative" val="1"/>
+                  <adec:decorative xmlns:adec="http://schemas.microsoft.com/office/drawing/2017/decorative" xmlns="" val="1"/>
                 </a:ext>
               </a:extLst>
             </p:cNvPr>
@@ -13704,7 +13774,7 @@
                   <a16:creationId xmlns:a16="http://schemas.microsoft.com/office/drawing/2014/main" id="{2AF5945E-96EF-472A-8B30-5AC427AA4007}"/>
                 </a:ext>
                 <a:ext uri="{C183D7F6-B498-43B3-948B-1728B52AA6E4}">
-                  <adec:decorative xmlns:adec="http://schemas.microsoft.com/office/drawing/2017/decorative" val="1"/>
+                  <adec:decorative xmlns:adec="http://schemas.microsoft.com/office/drawing/2017/decorative" xmlns="" val="1"/>
                 </a:ext>
               </a:extLst>
             </p:cNvPr>
@@ -13807,7 +13877,7 @@
                   <a16:creationId xmlns:a16="http://schemas.microsoft.com/office/drawing/2014/main" id="{F43F39F5-753C-4BA6-AF2B-6F0EEE25AD40}"/>
                 </a:ext>
                 <a:ext uri="{C183D7F6-B498-43B3-948B-1728B52AA6E4}">
-                  <adec:decorative xmlns:adec="http://schemas.microsoft.com/office/drawing/2017/decorative" val="1"/>
+                  <adec:decorative xmlns:adec="http://schemas.microsoft.com/office/drawing/2017/decorative" xmlns="" val="1"/>
                 </a:ext>
               </a:extLst>
             </p:cNvPr>
@@ -13910,7 +13980,7 @@
                   <a16:creationId xmlns:a16="http://schemas.microsoft.com/office/drawing/2014/main" id="{2CC5073C-8188-4DE4-B2AB-9C87DDA4F0F7}"/>
                 </a:ext>
                 <a:ext uri="{C183D7F6-B498-43B3-948B-1728B52AA6E4}">
-                  <adec:decorative xmlns:adec="http://schemas.microsoft.com/office/drawing/2017/decorative" val="1"/>
+                  <adec:decorative xmlns:adec="http://schemas.microsoft.com/office/drawing/2017/decorative" xmlns="" val="1"/>
                 </a:ext>
               </a:extLst>
             </p:cNvPr>
@@ -14013,7 +14083,7 @@
                   <a16:creationId xmlns:a16="http://schemas.microsoft.com/office/drawing/2014/main" id="{AEF2074A-D7D4-4AF6-866A-31DDF66B1F7B}"/>
                 </a:ext>
                 <a:ext uri="{C183D7F6-B498-43B3-948B-1728B52AA6E4}">
-                  <adec:decorative xmlns:adec="http://schemas.microsoft.com/office/drawing/2017/decorative" val="1"/>
+                  <adec:decorative xmlns:adec="http://schemas.microsoft.com/office/drawing/2017/decorative" xmlns="" val="1"/>
                 </a:ext>
               </a:extLst>
             </p:cNvPr>

</xml_diff>